<commit_message>
final submission, zero - day dataset
</commit_message>
<xml_diff>
--- a/Final_Submit/Presentation.pptx
+++ b/Final_Submit/Presentation.pptx
@@ -16,8 +16,8 @@
     <p:sldId id="263" r:id="rId7"/>
     <p:sldId id="264" r:id="rId8"/>
     <p:sldId id="258" r:id="rId9"/>
-    <p:sldId id="260" r:id="rId10"/>
-    <p:sldId id="266" r:id="rId11"/>
+    <p:sldId id="266" r:id="rId10"/>
+    <p:sldId id="260" r:id="rId11"/>
   </p:sldIdLst>
   <p:sldSz cx="12192000" cy="6858000"/>
   <p:notesSz cx="6858000" cy="9144000"/>
@@ -206,7 +206,7 @@
           <a:p>
             <a:fld id="{44DA9782-0670-4B02-A552-93A0539F4DFA}" type="datetimeFigureOut">
               <a:rPr lang="en-US" smtClean="0"/>
-              <a:t>12/5/2021</a:t>
+              <a:t>12/9/2021</a:t>
             </a:fld>
             <a:endParaRPr lang="en-US"/>
           </a:p>
@@ -518,6 +518,190 @@
           <a:bodyPr/>
           <a:lstStyle/>
           <a:p>
+            <a:r>
+              <a:rPr lang="he-IL"/>
+              <a:t>הסרת מידע שאינו רלוונטי, שעלול לפגום ביכולות החיזוי של המודל שלנו, עמודות עם שונות נמוכה שאינן תורמות </a:t>
+            </a:r>
+            <a:endParaRPr lang="en-US"/>
+          </a:p>
+        </p:txBody>
+      </p:sp>
+      <p:sp>
+        <p:nvSpPr>
+          <p:cNvPr id="4" name="מציין מיקום של מספר שקופית 3"/>
+          <p:cNvSpPr>
+            <a:spLocks noGrp="1"/>
+          </p:cNvSpPr>
+          <p:nvPr>
+            <p:ph type="sldNum" sz="quarter" idx="5"/>
+          </p:nvPr>
+        </p:nvSpPr>
+        <p:spPr/>
+        <p:txBody>
+          <a:bodyPr/>
+          <a:lstStyle/>
+          <a:p>
+            <a:fld id="{8B3F4F34-C0EB-4230-A2B3-BCAE36900459}" type="slidenum">
+              <a:rPr lang="en-US" smtClean="0"/>
+              <a:t>3</a:t>
+            </a:fld>
+            <a:endParaRPr lang="en-US"/>
+          </a:p>
+        </p:txBody>
+      </p:sp>
+    </p:spTree>
+    <p:extLst>
+      <p:ext uri="{BB962C8B-B14F-4D97-AF65-F5344CB8AC3E}">
+        <p14:creationId xmlns:p14="http://schemas.microsoft.com/office/powerpoint/2010/main" val="2522189898"/>
+      </p:ext>
+    </p:extLst>
+  </p:cSld>
+  <p:clrMapOvr>
+    <a:masterClrMapping/>
+  </p:clrMapOvr>
+</p:notes>
+</file>
+
+<file path=ppt/notesSlides/notesSlide2.xml><?xml version="1.0" encoding="utf-8"?>
+<p:notes xmlns:a="http://schemas.openxmlformats.org/drawingml/2006/main" xmlns:r="http://schemas.openxmlformats.org/officeDocument/2006/relationships" xmlns:p="http://schemas.openxmlformats.org/presentationml/2006/main">
+  <p:cSld>
+    <p:spTree>
+      <p:nvGrpSpPr>
+        <p:cNvPr id="1" name=""/>
+        <p:cNvGrpSpPr/>
+        <p:nvPr/>
+      </p:nvGrpSpPr>
+      <p:grpSpPr>
+        <a:xfrm>
+          <a:off x="0" y="0"/>
+          <a:ext cx="0" cy="0"/>
+          <a:chOff x="0" y="0"/>
+          <a:chExt cx="0" cy="0"/>
+        </a:xfrm>
+      </p:grpSpPr>
+      <p:sp>
+        <p:nvSpPr>
+          <p:cNvPr id="2" name="מציין מיקום של תמונת שקופית 1"/>
+          <p:cNvSpPr>
+            <a:spLocks noGrp="1" noRot="1" noChangeAspect="1"/>
+          </p:cNvSpPr>
+          <p:nvPr>
+            <p:ph type="sldImg"/>
+          </p:nvPr>
+        </p:nvSpPr>
+        <p:spPr/>
+      </p:sp>
+      <p:sp>
+        <p:nvSpPr>
+          <p:cNvPr id="3" name="מציין מיקום של הערות 2"/>
+          <p:cNvSpPr>
+            <a:spLocks noGrp="1"/>
+          </p:cNvSpPr>
+          <p:nvPr>
+            <p:ph type="body" idx="1"/>
+          </p:nvPr>
+        </p:nvSpPr>
+        <p:spPr/>
+        <p:txBody>
+          <a:bodyPr/>
+          <a:lstStyle/>
+          <a:p>
+            <a:r>
+              <a:rPr lang="he-IL"/>
+              <a:t>לפני שנאמן את המכונה נרצה לכוון ולחדד את המידע שיש לנו, להסיר ערכי </a:t>
+            </a:r>
+            <a:r>
+              <a:rPr lang="en-US"/>
+              <a:t>null</a:t>
+            </a:r>
+            <a:r>
+              <a:rPr lang="he-IL"/>
+              <a:t> אם קיימים, ליצור אחידות בין המידע.</a:t>
+            </a:r>
+            <a:endParaRPr lang="en-US"/>
+          </a:p>
+        </p:txBody>
+      </p:sp>
+      <p:sp>
+        <p:nvSpPr>
+          <p:cNvPr id="4" name="מציין מיקום של מספר שקופית 3"/>
+          <p:cNvSpPr>
+            <a:spLocks noGrp="1"/>
+          </p:cNvSpPr>
+          <p:nvPr>
+            <p:ph type="sldNum" sz="quarter" idx="5"/>
+          </p:nvPr>
+        </p:nvSpPr>
+        <p:spPr/>
+        <p:txBody>
+          <a:bodyPr/>
+          <a:lstStyle/>
+          <a:p>
+            <a:fld id="{8B3F4F34-C0EB-4230-A2B3-BCAE36900459}" type="slidenum">
+              <a:rPr lang="en-US" smtClean="0"/>
+              <a:t>4</a:t>
+            </a:fld>
+            <a:endParaRPr lang="en-US"/>
+          </a:p>
+        </p:txBody>
+      </p:sp>
+    </p:spTree>
+    <p:extLst>
+      <p:ext uri="{BB962C8B-B14F-4D97-AF65-F5344CB8AC3E}">
+        <p14:creationId xmlns:p14="http://schemas.microsoft.com/office/powerpoint/2010/main" val="1045341907"/>
+      </p:ext>
+    </p:extLst>
+  </p:cSld>
+  <p:clrMapOvr>
+    <a:masterClrMapping/>
+  </p:clrMapOvr>
+</p:notes>
+</file>
+
+<file path=ppt/notesSlides/notesSlide3.xml><?xml version="1.0" encoding="utf-8"?>
+<p:notes xmlns:a="http://schemas.openxmlformats.org/drawingml/2006/main" xmlns:r="http://schemas.openxmlformats.org/officeDocument/2006/relationships" xmlns:p="http://schemas.openxmlformats.org/presentationml/2006/main">
+  <p:cSld>
+    <p:spTree>
+      <p:nvGrpSpPr>
+        <p:cNvPr id="1" name=""/>
+        <p:cNvGrpSpPr/>
+        <p:nvPr/>
+      </p:nvGrpSpPr>
+      <p:grpSpPr>
+        <a:xfrm>
+          <a:off x="0" y="0"/>
+          <a:ext cx="0" cy="0"/>
+          <a:chOff x="0" y="0"/>
+          <a:chExt cx="0" cy="0"/>
+        </a:xfrm>
+      </p:grpSpPr>
+      <p:sp>
+        <p:nvSpPr>
+          <p:cNvPr id="2" name="מציין מיקום של תמונת שקופית 1"/>
+          <p:cNvSpPr>
+            <a:spLocks noGrp="1" noRot="1" noChangeAspect="1"/>
+          </p:cNvSpPr>
+          <p:nvPr>
+            <p:ph type="sldImg"/>
+          </p:nvPr>
+        </p:nvSpPr>
+        <p:spPr/>
+      </p:sp>
+      <p:sp>
+        <p:nvSpPr>
+          <p:cNvPr id="3" name="מציין מיקום של הערות 2"/>
+          <p:cNvSpPr>
+            <a:spLocks noGrp="1"/>
+          </p:cNvSpPr>
+          <p:nvPr>
+            <p:ph type="body" idx="1"/>
+          </p:nvPr>
+        </p:nvSpPr>
+        <p:spPr/>
+        <p:txBody>
+          <a:bodyPr/>
+          <a:lstStyle/>
+          <a:p>
             <a:endParaRPr lang="en-US"/>
           </a:p>
         </p:txBody>
@@ -707,7 +891,7 @@
           <a:p>
             <a:fld id="{C6A5EC66-C8FC-4D19-BA33-EB60ED36F1C4}" type="datetimeFigureOut">
               <a:rPr lang="en-US" smtClean="0"/>
-              <a:t>12/5/2021</a:t>
+              <a:t>12/9/2021</a:t>
             </a:fld>
             <a:endParaRPr lang="en-US"/>
           </a:p>
@@ -907,7 +1091,7 @@
           <a:p>
             <a:fld id="{C6A5EC66-C8FC-4D19-BA33-EB60ED36F1C4}" type="datetimeFigureOut">
               <a:rPr lang="en-US" smtClean="0"/>
-              <a:t>12/5/2021</a:t>
+              <a:t>12/9/2021</a:t>
             </a:fld>
             <a:endParaRPr lang="en-US"/>
           </a:p>
@@ -1117,7 +1301,7 @@
           <a:p>
             <a:fld id="{C6A5EC66-C8FC-4D19-BA33-EB60ED36F1C4}" type="datetimeFigureOut">
               <a:rPr lang="en-US" smtClean="0"/>
-              <a:t>12/5/2021</a:t>
+              <a:t>12/9/2021</a:t>
             </a:fld>
             <a:endParaRPr lang="en-US"/>
           </a:p>
@@ -1317,7 +1501,7 @@
           <a:p>
             <a:fld id="{C6A5EC66-C8FC-4D19-BA33-EB60ED36F1C4}" type="datetimeFigureOut">
               <a:rPr lang="en-US" smtClean="0"/>
-              <a:t>12/5/2021</a:t>
+              <a:t>12/9/2021</a:t>
             </a:fld>
             <a:endParaRPr lang="en-US"/>
           </a:p>
@@ -1593,7 +1777,7 @@
           <a:p>
             <a:fld id="{C6A5EC66-C8FC-4D19-BA33-EB60ED36F1C4}" type="datetimeFigureOut">
               <a:rPr lang="en-US" smtClean="0"/>
-              <a:t>12/5/2021</a:t>
+              <a:t>12/9/2021</a:t>
             </a:fld>
             <a:endParaRPr lang="en-US"/>
           </a:p>
@@ -1861,7 +2045,7 @@
           <a:p>
             <a:fld id="{C6A5EC66-C8FC-4D19-BA33-EB60ED36F1C4}" type="datetimeFigureOut">
               <a:rPr lang="en-US" smtClean="0"/>
-              <a:t>12/5/2021</a:t>
+              <a:t>12/9/2021</a:t>
             </a:fld>
             <a:endParaRPr lang="en-US"/>
           </a:p>
@@ -2276,7 +2460,7 @@
           <a:p>
             <a:fld id="{C6A5EC66-C8FC-4D19-BA33-EB60ED36F1C4}" type="datetimeFigureOut">
               <a:rPr lang="en-US" smtClean="0"/>
-              <a:t>12/5/2021</a:t>
+              <a:t>12/9/2021</a:t>
             </a:fld>
             <a:endParaRPr lang="en-US"/>
           </a:p>
@@ -2418,7 +2602,7 @@
           <a:p>
             <a:fld id="{C6A5EC66-C8FC-4D19-BA33-EB60ED36F1C4}" type="datetimeFigureOut">
               <a:rPr lang="en-US" smtClean="0"/>
-              <a:t>12/5/2021</a:t>
+              <a:t>12/9/2021</a:t>
             </a:fld>
             <a:endParaRPr lang="en-US"/>
           </a:p>
@@ -2531,7 +2715,7 @@
           <a:p>
             <a:fld id="{C6A5EC66-C8FC-4D19-BA33-EB60ED36F1C4}" type="datetimeFigureOut">
               <a:rPr lang="en-US" smtClean="0"/>
-              <a:t>12/5/2021</a:t>
+              <a:t>12/9/2021</a:t>
             </a:fld>
             <a:endParaRPr lang="en-US"/>
           </a:p>
@@ -2844,7 +3028,7 @@
           <a:p>
             <a:fld id="{C6A5EC66-C8FC-4D19-BA33-EB60ED36F1C4}" type="datetimeFigureOut">
               <a:rPr lang="en-US" smtClean="0"/>
-              <a:t>12/5/2021</a:t>
+              <a:t>12/9/2021</a:t>
             </a:fld>
             <a:endParaRPr lang="en-US"/>
           </a:p>
@@ -3133,7 +3317,7 @@
           <a:p>
             <a:fld id="{C6A5EC66-C8FC-4D19-BA33-EB60ED36F1C4}" type="datetimeFigureOut">
               <a:rPr lang="en-US" smtClean="0"/>
-              <a:t>12/5/2021</a:t>
+              <a:t>12/9/2021</a:t>
             </a:fld>
             <a:endParaRPr lang="en-US"/>
           </a:p>
@@ -3376,7 +3560,7 @@
           <a:p>
             <a:fld id="{C6A5EC66-C8FC-4D19-BA33-EB60ED36F1C4}" type="datetimeFigureOut">
               <a:rPr lang="en-US" smtClean="0"/>
-              <a:t>12/5/2021</a:t>
+              <a:t>12/9/2021</a:t>
             </a:fld>
             <a:endParaRPr lang="en-US"/>
           </a:p>
@@ -4168,27 +4352,29 @@
   <p:cSld>
     <p:bg>
       <p:bgPr>
-        <a:gradFill flip="none" rotWithShape="1">
+        <a:gradFill>
           <a:gsLst>
-            <a:gs pos="6000">
-              <a:schemeClr val="bg1"/>
+            <a:gs pos="0">
+              <a:schemeClr val="accent2">
+                <a:lumMod val="0"/>
+                <a:lumOff val="100000"/>
+              </a:schemeClr>
             </a:gs>
-            <a:gs pos="31000">
+            <a:gs pos="35000">
               <a:schemeClr val="accent2">
-                <a:lumMod val="40000"/>
-                <a:lumOff val="60000"/>
+                <a:lumMod val="0"/>
+                <a:lumOff val="100000"/>
               </a:schemeClr>
             </a:gs>
             <a:gs pos="100000">
-              <a:schemeClr val="accent2">
-                <a:lumMod val="75000"/>
+              <a:schemeClr val="bg1">
+                <a:lumMod val="65000"/>
               </a:schemeClr>
             </a:gs>
           </a:gsLst>
           <a:path path="circle">
-            <a:fillToRect l="50000" t="50000" r="50000" b="50000"/>
+            <a:fillToRect l="50000" t="-80000" r="50000" b="180000"/>
           </a:path>
-          <a:tileRect/>
         </a:gradFill>
         <a:effectLst/>
       </p:bgPr>
@@ -4209,72 +4395,406 @@
       </p:grpSpPr>
       <p:sp>
         <p:nvSpPr>
-          <p:cNvPr id="2" name="כותרת 1">
-            <a:extLst>
-              <a:ext uri="{FF2B5EF4-FFF2-40B4-BE49-F238E27FC236}">
-                <a16:creationId xmlns:a16="http://schemas.microsoft.com/office/drawing/2014/main" id="{366C9114-49B9-4C40-BFE9-291E1D9DE14C}"/>
+          <p:cNvPr id="31" name="Rectangle 30">
+            <a:extLst>
+              <a:ext uri="{FF2B5EF4-FFF2-40B4-BE49-F238E27FC236}">
+                <a16:creationId xmlns:a16="http://schemas.microsoft.com/office/drawing/2014/main" id="{823AC064-BC96-4F32-8AE1-B2FD38754823}"/>
+              </a:ext>
+              <a:ext uri="{C183D7F6-B498-43B3-948B-1728B52AA6E4}">
+                <adec:decorative xmlns:adec="http://schemas.microsoft.com/office/drawing/2017/decorative" val="1"/>
               </a:ext>
             </a:extLst>
           </p:cNvPr>
           <p:cNvSpPr>
-            <a:spLocks noGrp="1"/>
+            <a:spLocks noGrp="1" noRot="1" noChangeAspect="1" noMove="1" noResize="1" noEditPoints="1" noAdjustHandles="1" noChangeArrowheads="1" noChangeShapeType="1" noTextEdit="1"/>
           </p:cNvSpPr>
           <p:nvPr>
-            <p:ph type="title"/>
+            <p:extLst>
+              <p:ext uri="{386F3935-93C4-4BCD-93E2-E3B085C9AB24}">
+                <p16:designElem xmlns:p16="http://schemas.microsoft.com/office/powerpoint/2015/main" val="1"/>
+              </p:ext>
+            </p:extLst>
           </p:nvPr>
         </p:nvSpPr>
-        <p:spPr/>
-        <p:txBody>
-          <a:bodyPr>
+        <p:spPr bwMode="ltGray">
+          <a:xfrm>
+            <a:off x="396882" y="280374"/>
+            <a:ext cx="11438793" cy="1844256"/>
+          </a:xfrm>
+          <a:prstGeom prst="rect">
+            <a:avLst/>
+          </a:prstGeom>
+          <a:solidFill>
+            <a:srgbClr val="404040"/>
+          </a:solidFill>
+          <a:ln w="127000" cap="sq" cmpd="thinThick">
+            <a:solidFill>
+              <a:srgbClr val="404040"/>
+            </a:solidFill>
+          </a:ln>
+        </p:spPr>
+        <p:style>
+          <a:lnRef idx="2">
+            <a:schemeClr val="accent1">
+              <a:shade val="50000"/>
+            </a:schemeClr>
+          </a:lnRef>
+          <a:fillRef idx="1">
+            <a:schemeClr val="accent1"/>
+          </a:fillRef>
+          <a:effectRef idx="0">
+            <a:schemeClr val="accent1"/>
+          </a:effectRef>
+          <a:fontRef idx="minor">
+            <a:schemeClr val="lt1"/>
+          </a:fontRef>
+        </p:style>
+        <p:txBody>
+          <a:bodyPr rtlCol="0" anchor="ctr"/>
+          <a:lstStyle/>
+          <a:p>
+            <a:pPr algn="ctr"/>
+            <a:endParaRPr lang="en-US"/>
+          </a:p>
+        </p:txBody>
+      </p:sp>
+      <p:sp>
+        <p:nvSpPr>
+          <p:cNvPr id="4" name="מלבן 3">
+            <a:extLst>
+              <a:ext uri="{FF2B5EF4-FFF2-40B4-BE49-F238E27FC236}">
+                <a16:creationId xmlns:a16="http://schemas.microsoft.com/office/drawing/2014/main" id="{868D8032-3181-4F7B-AAE2-3562A11A10EA}"/>
+              </a:ext>
+            </a:extLst>
+          </p:cNvPr>
+          <p:cNvSpPr/>
+          <p:nvPr/>
+        </p:nvSpPr>
+        <p:spPr>
+          <a:xfrm>
+            <a:off x="546351" y="433545"/>
+            <a:ext cx="11139854" cy="930447"/>
+          </a:xfrm>
+          <a:prstGeom prst="rect">
+            <a:avLst/>
+          </a:prstGeom>
+        </p:spPr>
+        <p:txBody>
+          <a:bodyPr vert="horz" lIns="91440" tIns="45720" rIns="91440" bIns="45720" rtlCol="0" anchor="b">
             <a:normAutofit/>
           </a:bodyPr>
           <a:lstStyle/>
           <a:p>
-            <a:pPr algn="ctr"/>
-            <a:r>
-              <a:rPr lang="en-US" sz="6000" b="1">
+            <a:pPr algn="ctr" rtl="0">
+              <a:lnSpc>
+                <a:spcPct val="90000"/>
+              </a:lnSpc>
+              <a:spcBef>
+                <a:spcPct val="0"/>
+              </a:spcBef>
+              <a:spcAft>
+                <a:spcPts val="600"/>
+              </a:spcAft>
+            </a:pPr>
+            <a:r>
+              <a:rPr lang="en-US" sz="5400" b="1">
+                <a:ln w="0"/>
+                <a:solidFill>
+                  <a:srgbClr val="FFFFFF"/>
+                </a:solidFill>
                 <a:effectLst>
-                  <a:outerShdw blurRad="38100" dist="38100" dir="2700000" algn="tl">
-                    <a:srgbClr val="000000">
-                      <a:alpha val="43137"/>
+                  <a:outerShdw blurRad="38100" dist="25400" dir="5400000" algn="ctr" rotWithShape="0">
+                    <a:srgbClr val="6E747A">
+                      <a:alpha val="43000"/>
                     </a:srgbClr>
                   </a:outerShdw>
                 </a:effectLst>
+                <a:latin typeface="+mj-lt"/>
+                <a:ea typeface="+mj-ea"/>
+                <a:cs typeface="+mj-cs"/>
               </a:rPr>
-              <a:t>Conclusions</a:t>
-            </a:r>
-          </a:p>
-        </p:txBody>
-      </p:sp>
-      <p:sp>
-        <p:nvSpPr>
-          <p:cNvPr id="3" name="מציין מיקום תוכן 2">
-            <a:extLst>
-              <a:ext uri="{FF2B5EF4-FFF2-40B4-BE49-F238E27FC236}">
-                <a16:creationId xmlns:a16="http://schemas.microsoft.com/office/drawing/2014/main" id="{4D2441D6-1BC3-4BFD-B3A4-ED29C0D1CABA}"/>
-              </a:ext>
-            </a:extLst>
-          </p:cNvPr>
-          <p:cNvSpPr>
-            <a:spLocks noGrp="1"/>
-          </p:cNvSpPr>
+              <a:t>Brute Force Results</a:t>
+            </a:r>
+            <a:endParaRPr lang="en-US" sz="5400" b="1" cap="none" spc="0">
+              <a:ln w="0"/>
+              <a:solidFill>
+                <a:srgbClr val="FFFFFF"/>
+              </a:solidFill>
+              <a:effectLst>
+                <a:outerShdw blurRad="38100" dist="25400" dir="5400000" algn="ctr" rotWithShape="0">
+                  <a:srgbClr val="6E747A">
+                    <a:alpha val="43000"/>
+                  </a:srgbClr>
+                </a:outerShdw>
+              </a:effectLst>
+              <a:latin typeface="+mj-lt"/>
+              <a:ea typeface="+mj-ea"/>
+              <a:cs typeface="+mj-cs"/>
+            </a:endParaRPr>
+          </a:p>
+        </p:txBody>
+      </p:sp>
+      <p:cxnSp>
+        <p:nvCxnSpPr>
+          <p:cNvPr id="33" name="Straight Connector 32">
+            <a:extLst>
+              <a:ext uri="{FF2B5EF4-FFF2-40B4-BE49-F238E27FC236}">
+                <a16:creationId xmlns:a16="http://schemas.microsoft.com/office/drawing/2014/main" id="{7E7C77BC-7138-40B1-A15B-20F57A494629}"/>
+              </a:ext>
+              <a:ext uri="{C183D7F6-B498-43B3-948B-1728B52AA6E4}">
+                <adec:decorative xmlns:adec="http://schemas.microsoft.com/office/drawing/2017/decorative" val="1"/>
+              </a:ext>
+            </a:extLst>
+          </p:cNvPr>
+          <p:cNvCxnSpPr>
+            <a:cxnSpLocks noGrp="1" noRot="1" noChangeAspect="1" noMove="1" noResize="1" noEditPoints="1" noAdjustHandles="1" noChangeArrowheads="1" noChangeShapeType="1"/>
+          </p:cNvCxnSpPr>
           <p:nvPr>
-            <p:ph idx="1"/>
+            <p:extLst>
+              <p:ext uri="{386F3935-93C4-4BCD-93E2-E3B085C9AB24}">
+                <p16:designElem xmlns:p16="http://schemas.microsoft.com/office/powerpoint/2015/main" val="1"/>
+              </p:ext>
+            </p:extLst>
           </p:nvPr>
-        </p:nvSpPr>
-        <p:spPr/>
-        <p:txBody>
-          <a:bodyPr/>
-          <a:lstStyle/>
-          <a:p>
-            <a:endParaRPr lang="en-US"/>
-          </a:p>
-        </p:txBody>
-      </p:sp>
+        </p:nvCxnSpPr>
+        <p:spPr>
+          <a:xfrm>
+            <a:off x="2230078" y="1522292"/>
+            <a:ext cx="7772400" cy="0"/>
+          </a:xfrm>
+          <a:prstGeom prst="line">
+            <a:avLst/>
+          </a:prstGeom>
+          <a:ln w="22225">
+            <a:solidFill>
+              <a:srgbClr val="D9D9D9"/>
+            </a:solidFill>
+          </a:ln>
+        </p:spPr>
+        <p:style>
+          <a:lnRef idx="1">
+            <a:schemeClr val="accent1"/>
+          </a:lnRef>
+          <a:fillRef idx="0">
+            <a:schemeClr val="accent1"/>
+          </a:fillRef>
+          <a:effectRef idx="0">
+            <a:schemeClr val="accent1"/>
+          </a:effectRef>
+          <a:fontRef idx="minor">
+            <a:schemeClr val="tx1"/>
+          </a:fontRef>
+        </p:style>
+      </p:cxnSp>
+      <p:pic>
+        <p:nvPicPr>
+          <p:cNvPr id="24" name="גרפיקה 23" descr="תרשים עמודות עם מילוי מלא">
+            <a:extLst>
+              <a:ext uri="{FF2B5EF4-FFF2-40B4-BE49-F238E27FC236}">
+                <a16:creationId xmlns:a16="http://schemas.microsoft.com/office/drawing/2014/main" id="{FAAB4B9C-30CA-445D-B3E1-8465D2DF6F44}"/>
+              </a:ext>
+            </a:extLst>
+          </p:cNvPr>
+          <p:cNvPicPr>
+            <a:picLocks noChangeAspect="1"/>
+          </p:cNvPicPr>
+          <p:nvPr/>
+        </p:nvPicPr>
+        <p:blipFill>
+          <a:blip r:embed="rId2">
+            <a:extLst>
+              <a:ext uri="{28A0092B-C50C-407E-A947-70E740481C1C}">
+                <a14:useLocalDpi xmlns:a14="http://schemas.microsoft.com/office/drawing/2010/main" val="0"/>
+              </a:ext>
+              <a:ext uri="{96DAC541-7B7A-43D3-8B79-37D633B846F1}">
+                <asvg:svgBlip xmlns:asvg="http://schemas.microsoft.com/office/drawing/2016/SVG/main" r:embed="rId3"/>
+              </a:ext>
+            </a:extLst>
+          </a:blip>
+          <a:stretch>
+            <a:fillRect/>
+          </a:stretch>
+        </p:blipFill>
+        <p:spPr>
+          <a:xfrm>
+            <a:off x="13771" y="4751967"/>
+            <a:ext cx="657085" cy="657085"/>
+          </a:xfrm>
+          <a:prstGeom prst="rect">
+            <a:avLst/>
+          </a:prstGeom>
+        </p:spPr>
+      </p:pic>
+      <p:cxnSp>
+        <p:nvCxnSpPr>
+          <p:cNvPr id="35" name="Straight Connector 34">
+            <a:extLst>
+              <a:ext uri="{FF2B5EF4-FFF2-40B4-BE49-F238E27FC236}">
+                <a16:creationId xmlns:a16="http://schemas.microsoft.com/office/drawing/2014/main" id="{DB146403-F3D6-484B-B2ED-97F9565D0370}"/>
+              </a:ext>
+              <a:ext uri="{C183D7F6-B498-43B3-948B-1728B52AA6E4}">
+                <adec:decorative xmlns:adec="http://schemas.microsoft.com/office/drawing/2017/decorative" val="1"/>
+              </a:ext>
+            </a:extLst>
+          </p:cNvPr>
+          <p:cNvCxnSpPr>
+            <a:cxnSpLocks noGrp="1" noRot="1" noChangeAspect="1" noMove="1" noResize="1" noEditPoints="1" noAdjustHandles="1" noChangeArrowheads="1" noChangeShapeType="1"/>
+          </p:cNvCxnSpPr>
+          <p:nvPr>
+            <p:extLst>
+              <p:ext uri="{386F3935-93C4-4BCD-93E2-E3B085C9AB24}">
+                <p16:designElem xmlns:p16="http://schemas.microsoft.com/office/powerpoint/2015/main" val="1"/>
+              </p:ext>
+            </p:extLst>
+          </p:nvPr>
+        </p:nvCxnSpPr>
+        <p:spPr>
+          <a:xfrm>
+            <a:off x="6116278" y="2596836"/>
+            <a:ext cx="0" cy="3657600"/>
+          </a:xfrm>
+          <a:prstGeom prst="line">
+            <a:avLst/>
+          </a:prstGeom>
+          <a:ln w="101600" cmpd="dbl">
+            <a:solidFill>
+              <a:srgbClr val="595959"/>
+            </a:solidFill>
+          </a:ln>
+        </p:spPr>
+        <p:style>
+          <a:lnRef idx="1">
+            <a:schemeClr val="accent1"/>
+          </a:lnRef>
+          <a:fillRef idx="0">
+            <a:schemeClr val="accent1"/>
+          </a:fillRef>
+          <a:effectRef idx="0">
+            <a:schemeClr val="accent1"/>
+          </a:effectRef>
+          <a:fontRef idx="minor">
+            <a:schemeClr val="tx1"/>
+          </a:fontRef>
+        </p:style>
+      </p:cxnSp>
+      <p:pic>
+        <p:nvPicPr>
+          <p:cNvPr id="3" name="תמונה 2" descr="תמונה שמכילה שולחן&#10;&#10;התיאור נוצר באופן אוטומטי">
+            <a:extLst>
+              <a:ext uri="{FF2B5EF4-FFF2-40B4-BE49-F238E27FC236}">
+                <a16:creationId xmlns:a16="http://schemas.microsoft.com/office/drawing/2014/main" id="{29F9AC73-0A0F-4D18-BEAE-8595B3A9C2FB}"/>
+              </a:ext>
+            </a:extLst>
+          </p:cNvPr>
+          <p:cNvPicPr>
+            <a:picLocks noChangeAspect="1"/>
+          </p:cNvPicPr>
+          <p:nvPr/>
+        </p:nvPicPr>
+        <p:blipFill>
+          <a:blip r:embed="rId4">
+            <a:extLst>
+              <a:ext uri="{28A0092B-C50C-407E-A947-70E740481C1C}">
+                <a14:useLocalDpi xmlns:a14="http://schemas.microsoft.com/office/drawing/2010/main" val="0"/>
+              </a:ext>
+            </a:extLst>
+          </a:blip>
+          <a:stretch>
+            <a:fillRect/>
+          </a:stretch>
+        </p:blipFill>
+        <p:spPr>
+          <a:xfrm>
+            <a:off x="1446365" y="1680593"/>
+            <a:ext cx="9605595" cy="5006501"/>
+          </a:xfrm>
+          <a:prstGeom prst="rect">
+            <a:avLst/>
+          </a:prstGeom>
+        </p:spPr>
+      </p:pic>
+      <p:pic>
+        <p:nvPicPr>
+          <p:cNvPr id="14" name="גרפיקה 13" descr="תרשים עוגה עם מילוי מלא">
+            <a:extLst>
+              <a:ext uri="{FF2B5EF4-FFF2-40B4-BE49-F238E27FC236}">
+                <a16:creationId xmlns:a16="http://schemas.microsoft.com/office/drawing/2014/main" id="{3DBC9ACB-E9A2-42AF-88E6-31EF5AADCECF}"/>
+              </a:ext>
+            </a:extLst>
+          </p:cNvPr>
+          <p:cNvPicPr>
+            <a:picLocks noChangeAspect="1"/>
+          </p:cNvPicPr>
+          <p:nvPr/>
+        </p:nvPicPr>
+        <p:blipFill>
+          <a:blip r:embed="rId5">
+            <a:extLst>
+              <a:ext uri="{28A0092B-C50C-407E-A947-70E740481C1C}">
+                <a14:useLocalDpi xmlns:a14="http://schemas.microsoft.com/office/drawing/2010/main" val="0"/>
+              </a:ext>
+              <a:ext uri="{96DAC541-7B7A-43D3-8B79-37D633B846F1}">
+                <asvg:svgBlip xmlns:asvg="http://schemas.microsoft.com/office/drawing/2016/SVG/main" r:embed="rId6"/>
+              </a:ext>
+            </a:extLst>
+          </a:blip>
+          <a:stretch>
+            <a:fillRect/>
+          </a:stretch>
+        </p:blipFill>
+        <p:spPr>
+          <a:xfrm>
+            <a:off x="69998" y="6112791"/>
+            <a:ext cx="574303" cy="574303"/>
+          </a:xfrm>
+          <a:prstGeom prst="rect">
+            <a:avLst/>
+          </a:prstGeom>
+        </p:spPr>
+      </p:pic>
+      <p:pic>
+        <p:nvPicPr>
+          <p:cNvPr id="26" name="גרפיקה 25" descr="סטטיסטיקה עם מילוי מלא">
+            <a:extLst>
+              <a:ext uri="{FF2B5EF4-FFF2-40B4-BE49-F238E27FC236}">
+                <a16:creationId xmlns:a16="http://schemas.microsoft.com/office/drawing/2014/main" id="{95A563B4-DC37-4198-AC8D-9CD543AB67E9}"/>
+              </a:ext>
+            </a:extLst>
+          </p:cNvPr>
+          <p:cNvPicPr>
+            <a:picLocks noChangeAspect="1"/>
+          </p:cNvPicPr>
+          <p:nvPr/>
+        </p:nvPicPr>
+        <p:blipFill>
+          <a:blip r:embed="rId7">
+            <a:extLst>
+              <a:ext uri="{28A0092B-C50C-407E-A947-70E740481C1C}">
+                <a14:useLocalDpi xmlns:a14="http://schemas.microsoft.com/office/drawing/2010/main" val="0"/>
+              </a:ext>
+              <a:ext uri="{96DAC541-7B7A-43D3-8B79-37D633B846F1}">
+                <asvg:svgBlip xmlns:asvg="http://schemas.microsoft.com/office/drawing/2016/SVG/main" r:embed="rId8"/>
+              </a:ext>
+            </a:extLst>
+          </a:blip>
+          <a:stretch>
+            <a:fillRect/>
+          </a:stretch>
+        </p:blipFill>
+        <p:spPr>
+          <a:xfrm>
+            <a:off x="55163" y="5497096"/>
+            <a:ext cx="574303" cy="574303"/>
+          </a:xfrm>
+          <a:prstGeom prst="rect">
+            <a:avLst/>
+          </a:prstGeom>
+        </p:spPr>
+      </p:pic>
     </p:spTree>
     <p:extLst>
       <p:ext uri="{BB962C8B-B14F-4D97-AF65-F5344CB8AC3E}">
-        <p14:creationId xmlns:p14="http://schemas.microsoft.com/office/powerpoint/2010/main" val="2254459902"/>
+        <p14:creationId xmlns:p14="http://schemas.microsoft.com/office/powerpoint/2010/main" val="755506047"/>
       </p:ext>
     </p:extLst>
   </p:cSld>
@@ -4344,8 +4864,8 @@
         </p:nvSpPr>
         <p:spPr>
           <a:xfrm>
-            <a:off x="1992955" y="418688"/>
-            <a:ext cx="8206093" cy="923330"/>
+            <a:off x="4572477" y="1465860"/>
+            <a:ext cx="3191900" cy="923330"/>
           </a:xfrm>
           <a:prstGeom prst="rect">
             <a:avLst/>
@@ -4360,30 +4880,28 @@
           <a:p>
             <a:pPr algn="ctr"/>
             <a:r>
-              <a:rPr lang="he-IL" sz="5400" b="0" cap="none" spc="0">
-                <a:ln w="0"/>
-                <a:solidFill>
-                  <a:schemeClr val="tx1"/>
-                </a:solidFill>
+              <a:rPr lang="he-IL" sz="5400" b="1">
                 <a:effectLst>
-                  <a:outerShdw blurRad="38100" dist="19050" dir="2700000" algn="tl" rotWithShape="0">
-                    <a:schemeClr val="dk1">
-                      <a:alpha val="40000"/>
-                    </a:schemeClr>
+                  <a:outerShdw blurRad="38100" dist="38100" dir="2700000" algn="tl">
+                    <a:srgbClr val="000000">
+                      <a:alpha val="43137"/>
+                    </a:srgbClr>
                   </a:outerShdw>
                 </a:effectLst>
+                <a:latin typeface="David" panose="020E0502060401010101" pitchFamily="34" charset="-79"/>
+                <a:cs typeface="David" panose="020E0502060401010101" pitchFamily="34" charset="-79"/>
               </a:rPr>
-              <a:t>רעיונות לתהליך עבודה ראשוני</a:t>
-            </a:r>
-          </a:p>
-        </p:txBody>
-      </p:sp>
-      <p:sp>
-        <p:nvSpPr>
-          <p:cNvPr id="4" name="תיבת טקסט 3">
-            <a:extLst>
-              <a:ext uri="{FF2B5EF4-FFF2-40B4-BE49-F238E27FC236}">
-                <a16:creationId xmlns:a16="http://schemas.microsoft.com/office/drawing/2014/main" id="{CBCAB67C-66D8-491C-9FC1-4F9FB7854B4E}"/>
+              <a:t>מטרת העל:</a:t>
+            </a:r>
+          </a:p>
+        </p:txBody>
+      </p:sp>
+      <p:sp>
+        <p:nvSpPr>
+          <p:cNvPr id="5" name="תיבת טקסט 4">
+            <a:extLst>
+              <a:ext uri="{FF2B5EF4-FFF2-40B4-BE49-F238E27FC236}">
+                <a16:creationId xmlns:a16="http://schemas.microsoft.com/office/drawing/2014/main" id="{D7F365D7-4E30-4A93-9D09-28E3E8B737F0}"/>
               </a:ext>
             </a:extLst>
           </p:cNvPr>
@@ -4392,8 +4910,8 @@
         </p:nvSpPr>
         <p:spPr>
           <a:xfrm>
-            <a:off x="1256489" y="1342018"/>
-            <a:ext cx="9679021" cy="6786473"/>
+            <a:off x="1256489" y="2767280"/>
+            <a:ext cx="9679021" cy="1323439"/>
           </a:xfrm>
           <a:prstGeom prst="rect">
             <a:avLst/>
@@ -4401,263 +4919,20 @@
           <a:noFill/>
         </p:spPr>
         <p:txBody>
-          <a:bodyPr wrap="square" rtlCol="0">
+          <a:bodyPr wrap="square">
             <a:spAutoFit/>
           </a:bodyPr>
           <a:lstStyle/>
           <a:p>
-            <a:pPr marL="342900" indent="-342900">
-              <a:lnSpc>
-                <a:spcPct val="200000"/>
-              </a:lnSpc>
-              <a:buAutoNum type="arabicPeriod"/>
-            </a:pPr>
-            <a:r>
-              <a:rPr lang="he-IL" sz="2000">
+            <a:pPr algn="ctr"/>
+            <a:r>
+              <a:rPr lang="he-IL" sz="4000">
                 <a:latin typeface="David" panose="020E0502060401010101" pitchFamily="34" charset="-79"/>
                 <a:cs typeface="David" panose="020E0502060401010101" pitchFamily="34" charset="-79"/>
               </a:rPr>
-              <a:t>מחיקת עמודות שמכילות סטרינגים ונתונים "מסגירים" (</a:t>
-            </a:r>
-            <a:r>
-              <a:rPr lang="en-US" sz="2000">
-                <a:latin typeface="David" panose="020E0502060401010101" pitchFamily="34" charset="-79"/>
-                <a:cs typeface="David" panose="020E0502060401010101" pitchFamily="34" charset="-79"/>
-              </a:rPr>
-              <a:t>ip, ports, mac addresses,file_name</a:t>
-            </a:r>
-            <a:r>
-              <a:rPr lang="he-IL" sz="2000">
-                <a:latin typeface="David" panose="020E0502060401010101" pitchFamily="34" charset="-79"/>
-                <a:cs typeface="David" panose="020E0502060401010101" pitchFamily="34" charset="-79"/>
-              </a:rPr>
-              <a:t>...)</a:t>
-            </a:r>
-          </a:p>
-          <a:p>
-            <a:pPr marL="342900" indent="-342900">
-              <a:lnSpc>
-                <a:spcPct val="200000"/>
-              </a:lnSpc>
-              <a:buAutoNum type="arabicPeriod"/>
-            </a:pPr>
-            <a:r>
-              <a:rPr lang="he-IL" sz="2000">
-                <a:latin typeface="David" panose="020E0502060401010101" pitchFamily="34" charset="-79"/>
-                <a:cs typeface="David" panose="020E0502060401010101" pitchFamily="34" charset="-79"/>
-              </a:rPr>
-              <a:t>מחיקת מאפיינים שאינם גנריים מספיק וגורמים לסטייה שאינה מייצגת (</a:t>
-            </a:r>
-            <a:r>
-              <a:rPr lang="en-US" sz="2000" b="0" i="0">
-                <a:solidFill>
-                  <a:srgbClr val="222222"/>
-                </a:solidFill>
-                <a:effectLst/>
-                <a:latin typeface="David" panose="020E0502060401010101" pitchFamily="34" charset="-79"/>
-                <a:cs typeface="David" panose="020E0502060401010101" pitchFamily="34" charset="-79"/>
-              </a:rPr>
-              <a:t>src2dst_first_seen_ms</a:t>
-            </a:r>
-            <a:r>
-              <a:rPr lang="he-IL" sz="2000" b="0" i="0">
-                <a:solidFill>
-                  <a:srgbClr val="222222"/>
-                </a:solidFill>
-                <a:effectLst/>
-                <a:latin typeface="David" panose="020E0502060401010101" pitchFamily="34" charset="-79"/>
-                <a:cs typeface="David" panose="020E0502060401010101" pitchFamily="34" charset="-79"/>
-              </a:rPr>
-              <a:t>..)</a:t>
-            </a:r>
-            <a:endParaRPr lang="en-US" sz="2000" b="0" i="0">
-              <a:solidFill>
-                <a:srgbClr val="222222"/>
-              </a:solidFill>
-              <a:effectLst/>
-              <a:latin typeface="David" panose="020E0502060401010101" pitchFamily="34" charset="-79"/>
-              <a:cs typeface="David" panose="020E0502060401010101" pitchFamily="34" charset="-79"/>
-            </a:endParaRPr>
-          </a:p>
-          <a:p>
-            <a:pPr marL="342900" indent="-342900">
-              <a:lnSpc>
-                <a:spcPct val="200000"/>
-              </a:lnSpc>
-              <a:buAutoNum type="arabicPeriod"/>
-            </a:pPr>
-            <a:r>
-              <a:rPr lang="he-IL" sz="2000">
-                <a:solidFill>
-                  <a:srgbClr val="222222"/>
-                </a:solidFill>
-                <a:latin typeface="David" panose="020E0502060401010101" pitchFamily="34" charset="-79"/>
-                <a:cs typeface="David" panose="020E0502060401010101" pitchFamily="34" charset="-79"/>
-              </a:rPr>
-              <a:t>הסרה של עמודות / שורות שאינן תורמות ליכולות החיזוי של המודל – הן באמצעות מחקר על רלוונטיות של פיצ'רים והן באמצעות מטודולוגיות נהוגות בעולם הדאטה סייאנס.</a:t>
-            </a:r>
-            <a:endParaRPr lang="he-IL" sz="2000" b="0" i="0">
-              <a:solidFill>
-                <a:srgbClr val="222222"/>
-              </a:solidFill>
-              <a:effectLst/>
-              <a:latin typeface="David" panose="020E0502060401010101" pitchFamily="34" charset="-79"/>
-              <a:cs typeface="David" panose="020E0502060401010101" pitchFamily="34" charset="-79"/>
-            </a:endParaRPr>
-          </a:p>
-          <a:p>
-            <a:pPr marL="342900" indent="-342900">
-              <a:lnSpc>
-                <a:spcPct val="200000"/>
-              </a:lnSpc>
-              <a:buAutoNum type="arabicPeriod"/>
-            </a:pPr>
-            <a:r>
-              <a:rPr lang="he-IL" sz="2000">
-                <a:latin typeface="David" panose="020E0502060401010101" pitchFamily="34" charset="-79"/>
-                <a:cs typeface="David" panose="020E0502060401010101" pitchFamily="34" charset="-79"/>
-              </a:rPr>
-              <a:t>איתור מאפיינים משמעותיים באמצעות קריאת מחקרים, מאמרים, טרדים ב-</a:t>
-            </a:r>
-            <a:r>
-              <a:rPr lang="en-US" sz="2000">
-                <a:latin typeface="David" panose="020E0502060401010101" pitchFamily="34" charset="-79"/>
-                <a:cs typeface="David" panose="020E0502060401010101" pitchFamily="34" charset="-79"/>
-              </a:rPr>
-              <a:t>Stackoverflow, DataSciense StackExchange</a:t>
-            </a:r>
-            <a:r>
-              <a:rPr lang="he-IL" sz="2000">
-                <a:latin typeface="David" panose="020E0502060401010101" pitchFamily="34" charset="-79"/>
-                <a:cs typeface="David" panose="020E0502060401010101" pitchFamily="34" charset="-79"/>
-              </a:rPr>
-              <a:t> וכו' ... </a:t>
-            </a:r>
-          </a:p>
-          <a:p>
-            <a:pPr marL="342900" indent="-342900">
-              <a:lnSpc>
-                <a:spcPct val="200000"/>
-              </a:lnSpc>
-              <a:buAutoNum type="arabicPeriod"/>
-            </a:pPr>
-            <a:r>
-              <a:rPr lang="he-IL" sz="2000">
-                <a:latin typeface="David" panose="020E0502060401010101" pitchFamily="34" charset="-79"/>
-                <a:cs typeface="David" panose="020E0502060401010101" pitchFamily="34" charset="-79"/>
-              </a:rPr>
-              <a:t>עיבוד </a:t>
-            </a:r>
-            <a:r>
-              <a:rPr lang="en-US" sz="2000">
-                <a:latin typeface="David" panose="020E0502060401010101" pitchFamily="34" charset="-79"/>
-                <a:cs typeface="David" panose="020E0502060401010101" pitchFamily="34" charset="-79"/>
-              </a:rPr>
-              <a:t>Dataset</a:t>
-            </a:r>
-            <a:r>
-              <a:rPr lang="he-IL" sz="2000">
-                <a:latin typeface="David" panose="020E0502060401010101" pitchFamily="34" charset="-79"/>
-                <a:cs typeface="David" panose="020E0502060401010101" pitchFamily="34" charset="-79"/>
-              </a:rPr>
-              <a:t> באמצעות מטודולוגיות נהוגות בתחום ה-</a:t>
-            </a:r>
-            <a:r>
-              <a:rPr lang="en-US" sz="2000">
-                <a:latin typeface="David" panose="020E0502060401010101" pitchFamily="34" charset="-79"/>
-                <a:cs typeface="David" panose="020E0502060401010101" pitchFamily="34" charset="-79"/>
-              </a:rPr>
-              <a:t>Machine Learning </a:t>
-            </a:r>
-            <a:r>
-              <a:rPr lang="he-IL" sz="2000">
-                <a:latin typeface="David" panose="020E0502060401010101" pitchFamily="34" charset="-79"/>
-                <a:cs typeface="David" panose="020E0502060401010101" pitchFamily="34" charset="-79"/>
-              </a:rPr>
-              <a:t> וה-</a:t>
-            </a:r>
-            <a:r>
-              <a:rPr lang="en-US" sz="2000">
-                <a:latin typeface="David" panose="020E0502060401010101" pitchFamily="34" charset="-79"/>
-                <a:cs typeface="David" panose="020E0502060401010101" pitchFamily="34" charset="-79"/>
-              </a:rPr>
-              <a:t>AI</a:t>
-            </a:r>
-            <a:r>
-              <a:rPr lang="he-IL" sz="2000">
-                <a:latin typeface="David" panose="020E0502060401010101" pitchFamily="34" charset="-79"/>
-                <a:cs typeface="David" panose="020E0502060401010101" pitchFamily="34" charset="-79"/>
-              </a:rPr>
-              <a:t>.</a:t>
-            </a:r>
-          </a:p>
-          <a:p>
-            <a:pPr marL="342900" indent="-342900">
-              <a:lnSpc>
-                <a:spcPct val="200000"/>
-              </a:lnSpc>
-              <a:buAutoNum type="arabicPeriod"/>
-            </a:pPr>
-            <a:r>
-              <a:rPr lang="he-IL" sz="2000">
-                <a:latin typeface="David" panose="020E0502060401010101" pitchFamily="34" charset="-79"/>
-                <a:cs typeface="David" panose="020E0502060401010101" pitchFamily="34" charset="-79"/>
-              </a:rPr>
-              <a:t>הרצת אלגוריתמים חיזוי שונים והשוואת תוצאות </a:t>
-            </a:r>
-          </a:p>
-          <a:p>
-            <a:pPr marL="342900" indent="-342900">
-              <a:lnSpc>
-                <a:spcPct val="200000"/>
-              </a:lnSpc>
-              <a:buAutoNum type="arabicPeriod"/>
-            </a:pPr>
-            <a:r>
-              <a:rPr lang="he-IL" sz="2000">
-                <a:latin typeface="David" panose="020E0502060401010101" pitchFamily="34" charset="-79"/>
-                <a:cs typeface="David" panose="020E0502060401010101" pitchFamily="34" charset="-79"/>
-              </a:rPr>
-              <a:t>ניסיון שילוב אלגוריתמים באמצעות  </a:t>
-            </a:r>
-            <a:r>
-              <a:rPr lang="en-US" sz="2000">
-                <a:latin typeface="David" panose="020E0502060401010101" pitchFamily="34" charset="-79"/>
-                <a:cs typeface="David" panose="020E0502060401010101" pitchFamily="34" charset="-79"/>
-              </a:rPr>
-              <a:t>Ensemble</a:t>
-            </a:r>
-            <a:endParaRPr lang="he-IL" sz="2000">
-              <a:latin typeface="David" panose="020E0502060401010101" pitchFamily="34" charset="-79"/>
-              <a:cs typeface="David" panose="020E0502060401010101" pitchFamily="34" charset="-79"/>
-            </a:endParaRPr>
-          </a:p>
-          <a:p>
-            <a:pPr marL="342900" indent="-342900">
-              <a:lnSpc>
-                <a:spcPct val="200000"/>
-              </a:lnSpc>
-              <a:buAutoNum type="arabicPeriod"/>
-            </a:pPr>
-            <a:r>
-              <a:rPr lang="he-IL" sz="2000">
-                <a:latin typeface="David" panose="020E0502060401010101" pitchFamily="34" charset="-79"/>
-                <a:cs typeface="David" panose="020E0502060401010101" pitchFamily="34" charset="-79"/>
-              </a:rPr>
-              <a:t>ניבוי תוצאות באמצעות מספר אלגוריתמים שונים ובחירה הסתברותית של התוצאה הטובה ביותר</a:t>
-            </a:r>
-          </a:p>
-          <a:p>
-            <a:pPr marL="342900" indent="-342900">
-              <a:lnSpc>
-                <a:spcPct val="200000"/>
-              </a:lnSpc>
-              <a:buAutoNum type="arabicPeriod"/>
-            </a:pPr>
-            <a:endParaRPr lang="en-US" sz="2000">
-              <a:latin typeface="David" panose="020E0502060401010101" pitchFamily="34" charset="-79"/>
-              <a:cs typeface="David" panose="020E0502060401010101" pitchFamily="34" charset="-79"/>
-            </a:endParaRPr>
+              <a:t>יצירת מודל גנרי המשתמש בפיצ'רים רלוונטים בלבד ומספק מקסימום תוצאות. </a:t>
+            </a:r>
+            <a:endParaRPr lang="en-US" sz="4000"/>
           </a:p>
         </p:txBody>
       </p:sp>
@@ -4736,7 +5011,7 @@
           <p:nvPr/>
         </p:nvPicPr>
         <p:blipFill rotWithShape="1">
-          <a:blip r:embed="rId2"/>
+          <a:blip r:embed="rId3"/>
           <a:srcRect r="2290" b="1"/>
           <a:stretch/>
         </p:blipFill>
@@ -5326,13 +5601,13 @@
           <p:nvPr/>
         </p:nvPicPr>
         <p:blipFill>
-          <a:blip r:embed="rId3">
+          <a:blip r:embed="rId4">
             <a:extLst>
               <a:ext uri="{28A0092B-C50C-407E-A947-70E740481C1C}">
                 <a14:useLocalDpi xmlns:a14="http://schemas.microsoft.com/office/drawing/2010/main" val="0"/>
               </a:ext>
               <a:ext uri="{96DAC541-7B7A-43D3-8B79-37D633B846F1}">
-                <asvg:svgBlip xmlns:asvg="http://schemas.microsoft.com/office/drawing/2016/SVG/main" r:embed="rId4"/>
+                <asvg:svgBlip xmlns:asvg="http://schemas.microsoft.com/office/drawing/2016/SVG/main" r:embed="rId5"/>
               </a:ext>
             </a:extLst>
           </a:blip>
@@ -5365,13 +5640,13 @@
           <p:nvPr/>
         </p:nvPicPr>
         <p:blipFill>
-          <a:blip r:embed="rId5">
+          <a:blip r:embed="rId6">
             <a:extLst>
               <a:ext uri="{28A0092B-C50C-407E-A947-70E740481C1C}">
                 <a14:useLocalDpi xmlns:a14="http://schemas.microsoft.com/office/drawing/2010/main" val="0"/>
               </a:ext>
               <a:ext uri="{96DAC541-7B7A-43D3-8B79-37D633B846F1}">
-                <asvg:svgBlip xmlns:asvg="http://schemas.microsoft.com/office/drawing/2016/SVG/main" r:embed="rId6"/>
+                <asvg:svgBlip xmlns:asvg="http://schemas.microsoft.com/office/drawing/2016/SVG/main" r:embed="rId7"/>
               </a:ext>
             </a:extLst>
           </a:blip>
@@ -5404,13 +5679,13 @@
           <p:nvPr/>
         </p:nvPicPr>
         <p:blipFill>
-          <a:blip r:embed="rId7">
+          <a:blip r:embed="rId8">
             <a:extLst>
               <a:ext uri="{28A0092B-C50C-407E-A947-70E740481C1C}">
                 <a14:useLocalDpi xmlns:a14="http://schemas.microsoft.com/office/drawing/2010/main" val="0"/>
               </a:ext>
               <a:ext uri="{96DAC541-7B7A-43D3-8B79-37D633B846F1}">
-                <asvg:svgBlip xmlns:asvg="http://schemas.microsoft.com/office/drawing/2016/SVG/main" r:embed="rId8"/>
+                <asvg:svgBlip xmlns:asvg="http://schemas.microsoft.com/office/drawing/2016/SVG/main" r:embed="rId9"/>
               </a:ext>
             </a:extLst>
           </a:blip>
@@ -5443,13 +5718,13 @@
           <p:nvPr/>
         </p:nvPicPr>
         <p:blipFill>
-          <a:blip r:embed="rId9">
+          <a:blip r:embed="rId10">
             <a:extLst>
               <a:ext uri="{28A0092B-C50C-407E-A947-70E740481C1C}">
                 <a14:useLocalDpi xmlns:a14="http://schemas.microsoft.com/office/drawing/2010/main" val="0"/>
               </a:ext>
               <a:ext uri="{96DAC541-7B7A-43D3-8B79-37D633B846F1}">
-                <asvg:svgBlip xmlns:asvg="http://schemas.microsoft.com/office/drawing/2016/SVG/main" r:embed="rId10"/>
+                <asvg:svgBlip xmlns:asvg="http://schemas.microsoft.com/office/drawing/2016/SVG/main" r:embed="rId11"/>
               </a:ext>
             </a:extLst>
           </a:blip>
@@ -5961,13 +6236,13 @@
           <p:nvPr/>
         </p:nvPicPr>
         <p:blipFill>
-          <a:blip r:embed="rId2">
+          <a:blip r:embed="rId3">
             <a:extLst>
               <a:ext uri="{28A0092B-C50C-407E-A947-70E740481C1C}">
                 <a14:useLocalDpi xmlns:a14="http://schemas.microsoft.com/office/drawing/2010/main" val="0"/>
               </a:ext>
               <a:ext uri="{96DAC541-7B7A-43D3-8B79-37D633B846F1}">
-                <asvg:svgBlip xmlns:asvg="http://schemas.microsoft.com/office/drawing/2016/SVG/main" r:embed="rId3"/>
+                <asvg:svgBlip xmlns:asvg="http://schemas.microsoft.com/office/drawing/2016/SVG/main" r:embed="rId4"/>
               </a:ext>
             </a:extLst>
           </a:blip>
@@ -6000,13 +6275,13 @@
           <p:nvPr/>
         </p:nvPicPr>
         <p:blipFill>
-          <a:blip r:embed="rId2">
+          <a:blip r:embed="rId3">
             <a:extLst>
               <a:ext uri="{28A0092B-C50C-407E-A947-70E740481C1C}">
                 <a14:useLocalDpi xmlns:a14="http://schemas.microsoft.com/office/drawing/2010/main" val="0"/>
               </a:ext>
               <a:ext uri="{96DAC541-7B7A-43D3-8B79-37D633B846F1}">
-                <asvg:svgBlip xmlns:asvg="http://schemas.microsoft.com/office/drawing/2016/SVG/main" r:embed="rId3"/>
+                <asvg:svgBlip xmlns:asvg="http://schemas.microsoft.com/office/drawing/2016/SVG/main" r:embed="rId4"/>
               </a:ext>
             </a:extLst>
           </a:blip>
@@ -7555,8 +7830,8 @@
         </p:nvSpPr>
         <p:spPr>
           <a:xfrm>
-            <a:off x="729763" y="3063022"/>
-            <a:ext cx="10531867" cy="3257174"/>
+            <a:off x="827039" y="2738305"/>
+            <a:ext cx="10531867" cy="3903504"/>
           </a:xfrm>
           <a:prstGeom prst="rect">
             <a:avLst/>
@@ -7687,6 +7962,43 @@
               </a:rPr>
               <a:t>GenericUnivariateSelect</a:t>
             </a:r>
+            <a:endParaRPr lang="he-IL" sz="2800">
+              <a:ln w="0"/>
+              <a:cs typeface="Arial" panose="020B0604020202020204" pitchFamily="34" charset="0"/>
+            </a:endParaRPr>
+          </a:p>
+          <a:p>
+            <a:pPr marL="457200" indent="-457200" algn="ctr">
+              <a:lnSpc>
+                <a:spcPct val="150000"/>
+              </a:lnSpc>
+              <a:buAutoNum type="arabicPeriod"/>
+            </a:pPr>
+            <a:r>
+              <a:rPr lang="he-IL" sz="2800">
+                <a:ln w="0"/>
+                <a:cs typeface="Arial" panose="020B0604020202020204" pitchFamily="34" charset="0"/>
+              </a:rPr>
+              <a:t>בדיקה ידנית של פיצ'רים וחקירתם – האם הם מעודדים </a:t>
+            </a:r>
+            <a:r>
+              <a:rPr lang="en-US" sz="2800">
+                <a:ln w="0"/>
+                <a:cs typeface="Arial" panose="020B0604020202020204" pitchFamily="34" charset="0"/>
+              </a:rPr>
+              <a:t>Overfitting</a:t>
+            </a:r>
+            <a:r>
+              <a:rPr lang="he-IL" sz="2800">
+                <a:ln w="0"/>
+                <a:cs typeface="Arial" panose="020B0604020202020204" pitchFamily="34" charset="0"/>
+              </a:rPr>
+              <a:t>?</a:t>
+            </a:r>
+            <a:endParaRPr lang="en-US" sz="2800">
+              <a:ln w="0"/>
+              <a:cs typeface="Arial" panose="020B0604020202020204" pitchFamily="34" charset="0"/>
+            </a:endParaRPr>
           </a:p>
         </p:txBody>
       </p:sp>
@@ -7793,7 +8105,7 @@
         </p:nvSpPr>
         <p:spPr>
           <a:xfrm>
-            <a:off x="1028698" y="1868458"/>
+            <a:off x="1028698" y="1578026"/>
             <a:ext cx="10444843" cy="1015663"/>
           </a:xfrm>
           <a:prstGeom prst="rect">
@@ -7820,7 +8132,7 @@
                 <a:latin typeface="inherit"/>
                 <a:cs typeface="Arial" panose="020B0604020202020204" pitchFamily="34" charset="0"/>
               </a:rPr>
-              <a:t>תהליך של בידוד התכונות העיקריות, הכי רלוונטיות לשימוש בבניית מודל.</a:t>
+              <a:t>תהליך של בידוד התכונות העיקריות, הכי רלוונטיות לשימוש בבניית מודל והפיכתו למודל גנרי.</a:t>
             </a:r>
           </a:p>
           <a:p>
@@ -7865,21 +8177,7 @@
                 <a:latin typeface="inherit"/>
                 <a:cs typeface="Arial" panose="020B0604020202020204" pitchFamily="34" charset="0"/>
               </a:rPr>
-              <a:t> היא לשפר את הביצועים של מודל חזוי ולהפחית את העלות החישובית של המידול</a:t>
-            </a:r>
-            <a:r>
-              <a:rPr kumimoji="0" lang="en-US" altLang="en-US" sz="2000" b="0" i="0" u="none" strike="noStrike" cap="none" normalizeH="0" baseline="0">
-                <a:ln>
-                  <a:noFill/>
-                </a:ln>
-                <a:solidFill>
-                  <a:srgbClr val="202124"/>
-                </a:solidFill>
-                <a:effectLst/>
-                <a:latin typeface="inherit"/>
-                <a:cs typeface="Arial" panose="020B0604020202020204" pitchFamily="34" charset="0"/>
-              </a:rPr>
-              <a:t>.</a:t>
+              <a:t> היא לשפר את הביצועים של מודל חזוי ולהפחית את העלות החישובית של המידול.</a:t>
             </a:r>
             <a:endParaRPr kumimoji="0" lang="en-US" altLang="en-US" sz="2000" b="0" i="0" u="none" strike="noStrike" cap="none" normalizeH="0" baseline="0">
               <a:ln>
@@ -8979,14 +9277,14 @@
             <a:pPr algn="ctr"/>
             <a:r>
               <a:rPr lang="en-US"/>
-              <a:t>AdaBoost</a:t>
+              <a:t>Random</a:t>
             </a:r>
           </a:p>
           <a:p>
             <a:pPr algn="ctr"/>
             <a:r>
               <a:rPr lang="en-US"/>
-              <a:t>Classifier</a:t>
+              <a:t>Forest</a:t>
             </a:r>
           </a:p>
         </p:txBody>
@@ -9065,29 +9363,27 @@
   <p:cSld>
     <p:bg>
       <p:bgPr>
-        <a:gradFill>
+        <a:gradFill flip="none" rotWithShape="1">
           <a:gsLst>
-            <a:gs pos="0">
+            <a:gs pos="6000">
+              <a:schemeClr val="bg1"/>
+            </a:gs>
+            <a:gs pos="31000">
               <a:schemeClr val="accent2">
-                <a:lumMod val="0"/>
-                <a:lumOff val="100000"/>
-              </a:schemeClr>
-            </a:gs>
-            <a:gs pos="35000">
-              <a:schemeClr val="accent2">
-                <a:lumMod val="0"/>
-                <a:lumOff val="100000"/>
+                <a:lumMod val="40000"/>
+                <a:lumOff val="60000"/>
               </a:schemeClr>
             </a:gs>
             <a:gs pos="100000">
-              <a:schemeClr val="bg1">
-                <a:lumMod val="65000"/>
+              <a:schemeClr val="accent2">
+                <a:lumMod val="75000"/>
               </a:schemeClr>
             </a:gs>
           </a:gsLst>
           <a:path path="circle">
-            <a:fillToRect l="50000" t="-80000" r="50000" b="180000"/>
+            <a:fillToRect l="50000" t="50000" r="50000" b="50000"/>
           </a:path>
+          <a:tileRect/>
         </a:gradFill>
         <a:effectLst/>
       </p:bgPr>
@@ -9108,406 +9404,52 @@
       </p:grpSpPr>
       <p:sp>
         <p:nvSpPr>
-          <p:cNvPr id="31" name="Rectangle 30">
-            <a:extLst>
-              <a:ext uri="{FF2B5EF4-FFF2-40B4-BE49-F238E27FC236}">
-                <a16:creationId xmlns:a16="http://schemas.microsoft.com/office/drawing/2014/main" id="{823AC064-BC96-4F32-8AE1-B2FD38754823}"/>
-              </a:ext>
-              <a:ext uri="{C183D7F6-B498-43B3-948B-1728B52AA6E4}">
-                <adec:decorative xmlns:adec="http://schemas.microsoft.com/office/drawing/2017/decorative" val="1"/>
+          <p:cNvPr id="2" name="כותרת 1">
+            <a:extLst>
+              <a:ext uri="{FF2B5EF4-FFF2-40B4-BE49-F238E27FC236}">
+                <a16:creationId xmlns:a16="http://schemas.microsoft.com/office/drawing/2014/main" id="{366C9114-49B9-4C40-BFE9-291E1D9DE14C}"/>
               </a:ext>
             </a:extLst>
           </p:cNvPr>
           <p:cNvSpPr>
-            <a:spLocks noGrp="1" noRot="1" noChangeAspect="1" noMove="1" noResize="1" noEditPoints="1" noAdjustHandles="1" noChangeArrowheads="1" noChangeShapeType="1" noTextEdit="1"/>
+            <a:spLocks noGrp="1"/>
           </p:cNvSpPr>
           <p:nvPr>
-            <p:extLst>
-              <p:ext uri="{386F3935-93C4-4BCD-93E2-E3B085C9AB24}">
-                <p16:designElem xmlns:p16="http://schemas.microsoft.com/office/powerpoint/2015/main" val="1"/>
-              </p:ext>
-            </p:extLst>
+            <p:ph type="title"/>
           </p:nvPr>
-        </p:nvSpPr>
-        <p:spPr bwMode="ltGray">
-          <a:xfrm>
-            <a:off x="396882" y="280374"/>
-            <a:ext cx="11438793" cy="1844256"/>
-          </a:xfrm>
-          <a:prstGeom prst="rect">
-            <a:avLst/>
-          </a:prstGeom>
-          <a:solidFill>
-            <a:srgbClr val="404040"/>
-          </a:solidFill>
-          <a:ln w="127000" cap="sq" cmpd="thinThick">
-            <a:solidFill>
-              <a:srgbClr val="404040"/>
-            </a:solidFill>
-          </a:ln>
-        </p:spPr>
-        <p:style>
-          <a:lnRef idx="2">
-            <a:schemeClr val="accent1">
-              <a:shade val="50000"/>
-            </a:schemeClr>
-          </a:lnRef>
-          <a:fillRef idx="1">
-            <a:schemeClr val="accent1"/>
-          </a:fillRef>
-          <a:effectRef idx="0">
-            <a:schemeClr val="accent1"/>
-          </a:effectRef>
-          <a:fontRef idx="minor">
-            <a:schemeClr val="lt1"/>
-          </a:fontRef>
-        </p:style>
-        <p:txBody>
-          <a:bodyPr rtlCol="0" anchor="ctr"/>
-          <a:lstStyle/>
-          <a:p>
-            <a:pPr algn="ctr"/>
-            <a:endParaRPr lang="en-US"/>
-          </a:p>
-        </p:txBody>
-      </p:sp>
-      <p:sp>
-        <p:nvSpPr>
-          <p:cNvPr id="4" name="מלבן 3">
-            <a:extLst>
-              <a:ext uri="{FF2B5EF4-FFF2-40B4-BE49-F238E27FC236}">
-                <a16:creationId xmlns:a16="http://schemas.microsoft.com/office/drawing/2014/main" id="{868D8032-3181-4F7B-AAE2-3562A11A10EA}"/>
-              </a:ext>
-            </a:extLst>
-          </p:cNvPr>
-          <p:cNvSpPr/>
-          <p:nvPr/>
         </p:nvSpPr>
         <p:spPr>
           <a:xfrm>
-            <a:off x="546351" y="433545"/>
-            <a:ext cx="11139854" cy="930447"/>
+            <a:off x="919681" y="2592277"/>
+            <a:ext cx="10515600" cy="1325563"/>
           </a:xfrm>
-          <a:prstGeom prst="rect">
-            <a:avLst/>
-          </a:prstGeom>
         </p:spPr>
         <p:txBody>
-          <a:bodyPr vert="horz" lIns="91440" tIns="45720" rIns="91440" bIns="45720" rtlCol="0" anchor="b">
+          <a:bodyPr>
             <a:normAutofit/>
           </a:bodyPr>
           <a:lstStyle/>
           <a:p>
-            <a:pPr algn="ctr" rtl="0">
-              <a:lnSpc>
-                <a:spcPct val="90000"/>
-              </a:lnSpc>
-              <a:spcBef>
-                <a:spcPct val="0"/>
-              </a:spcBef>
-              <a:spcAft>
-                <a:spcPts val="600"/>
-              </a:spcAft>
-            </a:pPr>
-            <a:r>
-              <a:rPr lang="en-US" sz="5400" b="1">
-                <a:ln w="0"/>
-                <a:solidFill>
-                  <a:srgbClr val="FFFFFF"/>
-                </a:solidFill>
+            <a:pPr algn="ctr"/>
+            <a:r>
+              <a:rPr lang="en-US" sz="6000" b="1">
                 <a:effectLst>
-                  <a:outerShdw blurRad="38100" dist="25400" dir="5400000" algn="ctr" rotWithShape="0">
-                    <a:srgbClr val="6E747A">
-                      <a:alpha val="43000"/>
+                  <a:outerShdw blurRad="38100" dist="38100" dir="2700000" algn="tl">
+                    <a:srgbClr val="000000">
+                      <a:alpha val="43137"/>
                     </a:srgbClr>
                   </a:outerShdw>
                 </a:effectLst>
-                <a:latin typeface="+mj-lt"/>
-                <a:ea typeface="+mj-ea"/>
-                <a:cs typeface="+mj-cs"/>
               </a:rPr>
-              <a:t>תוצאות</a:t>
-            </a:r>
-            <a:endParaRPr lang="en-US" sz="5400" b="1" cap="none" spc="0">
-              <a:ln w="0"/>
-              <a:solidFill>
-                <a:srgbClr val="FFFFFF"/>
-              </a:solidFill>
-              <a:effectLst>
-                <a:outerShdw blurRad="38100" dist="25400" dir="5400000" algn="ctr" rotWithShape="0">
-                  <a:srgbClr val="6E747A">
-                    <a:alpha val="43000"/>
-                  </a:srgbClr>
-                </a:outerShdw>
-              </a:effectLst>
-              <a:latin typeface="+mj-lt"/>
-              <a:ea typeface="+mj-ea"/>
-              <a:cs typeface="+mj-cs"/>
-            </a:endParaRPr>
-          </a:p>
-        </p:txBody>
-      </p:sp>
-      <p:cxnSp>
-        <p:nvCxnSpPr>
-          <p:cNvPr id="33" name="Straight Connector 32">
-            <a:extLst>
-              <a:ext uri="{FF2B5EF4-FFF2-40B4-BE49-F238E27FC236}">
-                <a16:creationId xmlns:a16="http://schemas.microsoft.com/office/drawing/2014/main" id="{7E7C77BC-7138-40B1-A15B-20F57A494629}"/>
-              </a:ext>
-              <a:ext uri="{C183D7F6-B498-43B3-948B-1728B52AA6E4}">
-                <adec:decorative xmlns:adec="http://schemas.microsoft.com/office/drawing/2017/decorative" val="1"/>
-              </a:ext>
-            </a:extLst>
-          </p:cNvPr>
-          <p:cNvCxnSpPr>
-            <a:cxnSpLocks noGrp="1" noRot="1" noChangeAspect="1" noMove="1" noResize="1" noEditPoints="1" noAdjustHandles="1" noChangeArrowheads="1" noChangeShapeType="1"/>
-          </p:cNvCxnSpPr>
-          <p:nvPr>
-            <p:extLst>
-              <p:ext uri="{386F3935-93C4-4BCD-93E2-E3B085C9AB24}">
-                <p16:designElem xmlns:p16="http://schemas.microsoft.com/office/powerpoint/2015/main" val="1"/>
-              </p:ext>
-            </p:extLst>
-          </p:nvPr>
-        </p:nvCxnSpPr>
-        <p:spPr>
-          <a:xfrm>
-            <a:off x="2230078" y="1522292"/>
-            <a:ext cx="7772400" cy="0"/>
-          </a:xfrm>
-          <a:prstGeom prst="line">
-            <a:avLst/>
-          </a:prstGeom>
-          <a:ln w="22225">
-            <a:solidFill>
-              <a:srgbClr val="D9D9D9"/>
-            </a:solidFill>
-          </a:ln>
-        </p:spPr>
-        <p:style>
-          <a:lnRef idx="1">
-            <a:schemeClr val="accent1"/>
-          </a:lnRef>
-          <a:fillRef idx="0">
-            <a:schemeClr val="accent1"/>
-          </a:fillRef>
-          <a:effectRef idx="0">
-            <a:schemeClr val="accent1"/>
-          </a:effectRef>
-          <a:fontRef idx="minor">
-            <a:schemeClr val="tx1"/>
-          </a:fontRef>
-        </p:style>
-      </p:cxnSp>
-      <p:pic>
-        <p:nvPicPr>
-          <p:cNvPr id="24" name="גרפיקה 23" descr="תרשים עמודות עם מילוי מלא">
-            <a:extLst>
-              <a:ext uri="{FF2B5EF4-FFF2-40B4-BE49-F238E27FC236}">
-                <a16:creationId xmlns:a16="http://schemas.microsoft.com/office/drawing/2014/main" id="{FAAB4B9C-30CA-445D-B3E1-8465D2DF6F44}"/>
-              </a:ext>
-            </a:extLst>
-          </p:cNvPr>
-          <p:cNvPicPr>
-            <a:picLocks noChangeAspect="1"/>
-          </p:cNvPicPr>
-          <p:nvPr/>
-        </p:nvPicPr>
-        <p:blipFill>
-          <a:blip r:embed="rId2">
-            <a:extLst>
-              <a:ext uri="{28A0092B-C50C-407E-A947-70E740481C1C}">
-                <a14:useLocalDpi xmlns:a14="http://schemas.microsoft.com/office/drawing/2010/main" val="0"/>
-              </a:ext>
-              <a:ext uri="{96DAC541-7B7A-43D3-8B79-37D633B846F1}">
-                <asvg:svgBlip xmlns:asvg="http://schemas.microsoft.com/office/drawing/2016/SVG/main" r:embed="rId3"/>
-              </a:ext>
-            </a:extLst>
-          </a:blip>
-          <a:stretch>
-            <a:fillRect/>
-          </a:stretch>
-        </p:blipFill>
-        <p:spPr>
-          <a:xfrm>
-            <a:off x="13771" y="4751967"/>
-            <a:ext cx="657085" cy="657085"/>
-          </a:xfrm>
-          <a:prstGeom prst="rect">
-            <a:avLst/>
-          </a:prstGeom>
-        </p:spPr>
-      </p:pic>
-      <p:cxnSp>
-        <p:nvCxnSpPr>
-          <p:cNvPr id="35" name="Straight Connector 34">
-            <a:extLst>
-              <a:ext uri="{FF2B5EF4-FFF2-40B4-BE49-F238E27FC236}">
-                <a16:creationId xmlns:a16="http://schemas.microsoft.com/office/drawing/2014/main" id="{DB146403-F3D6-484B-B2ED-97F9565D0370}"/>
-              </a:ext>
-              <a:ext uri="{C183D7F6-B498-43B3-948B-1728B52AA6E4}">
-                <adec:decorative xmlns:adec="http://schemas.microsoft.com/office/drawing/2017/decorative" val="1"/>
-              </a:ext>
-            </a:extLst>
-          </p:cNvPr>
-          <p:cNvCxnSpPr>
-            <a:cxnSpLocks noGrp="1" noRot="1" noChangeAspect="1" noMove="1" noResize="1" noEditPoints="1" noAdjustHandles="1" noChangeArrowheads="1" noChangeShapeType="1"/>
-          </p:cNvCxnSpPr>
-          <p:nvPr>
-            <p:extLst>
-              <p:ext uri="{386F3935-93C4-4BCD-93E2-E3B085C9AB24}">
-                <p16:designElem xmlns:p16="http://schemas.microsoft.com/office/powerpoint/2015/main" val="1"/>
-              </p:ext>
-            </p:extLst>
-          </p:nvPr>
-        </p:nvCxnSpPr>
-        <p:spPr>
-          <a:xfrm>
-            <a:off x="6116278" y="2596836"/>
-            <a:ext cx="0" cy="3657600"/>
-          </a:xfrm>
-          <a:prstGeom prst="line">
-            <a:avLst/>
-          </a:prstGeom>
-          <a:ln w="101600" cmpd="dbl">
-            <a:solidFill>
-              <a:srgbClr val="595959"/>
-            </a:solidFill>
-          </a:ln>
-        </p:spPr>
-        <p:style>
-          <a:lnRef idx="1">
-            <a:schemeClr val="accent1"/>
-          </a:lnRef>
-          <a:fillRef idx="0">
-            <a:schemeClr val="accent1"/>
-          </a:fillRef>
-          <a:effectRef idx="0">
-            <a:schemeClr val="accent1"/>
-          </a:effectRef>
-          <a:fontRef idx="minor">
-            <a:schemeClr val="tx1"/>
-          </a:fontRef>
-        </p:style>
-      </p:cxnSp>
-      <p:pic>
-        <p:nvPicPr>
-          <p:cNvPr id="3" name="תמונה 2" descr="תמונה שמכילה שולחן&#10;&#10;התיאור נוצר באופן אוטומטי">
-            <a:extLst>
-              <a:ext uri="{FF2B5EF4-FFF2-40B4-BE49-F238E27FC236}">
-                <a16:creationId xmlns:a16="http://schemas.microsoft.com/office/drawing/2014/main" id="{29F9AC73-0A0F-4D18-BEAE-8595B3A9C2FB}"/>
-              </a:ext>
-            </a:extLst>
-          </p:cNvPr>
-          <p:cNvPicPr>
-            <a:picLocks noChangeAspect="1"/>
-          </p:cNvPicPr>
-          <p:nvPr/>
-        </p:nvPicPr>
-        <p:blipFill>
-          <a:blip r:embed="rId4">
-            <a:extLst>
-              <a:ext uri="{28A0092B-C50C-407E-A947-70E740481C1C}">
-                <a14:useLocalDpi xmlns:a14="http://schemas.microsoft.com/office/drawing/2010/main" val="0"/>
-              </a:ext>
-            </a:extLst>
-          </a:blip>
-          <a:stretch>
-            <a:fillRect/>
-          </a:stretch>
-        </p:blipFill>
-        <p:spPr>
-          <a:xfrm>
-            <a:off x="1446365" y="1680593"/>
-            <a:ext cx="9605595" cy="5006501"/>
-          </a:xfrm>
-          <a:prstGeom prst="rect">
-            <a:avLst/>
-          </a:prstGeom>
-        </p:spPr>
-      </p:pic>
-      <p:pic>
-        <p:nvPicPr>
-          <p:cNvPr id="14" name="גרפיקה 13" descr="תרשים עוגה עם מילוי מלא">
-            <a:extLst>
-              <a:ext uri="{FF2B5EF4-FFF2-40B4-BE49-F238E27FC236}">
-                <a16:creationId xmlns:a16="http://schemas.microsoft.com/office/drawing/2014/main" id="{3DBC9ACB-E9A2-42AF-88E6-31EF5AADCECF}"/>
-              </a:ext>
-            </a:extLst>
-          </p:cNvPr>
-          <p:cNvPicPr>
-            <a:picLocks noChangeAspect="1"/>
-          </p:cNvPicPr>
-          <p:nvPr/>
-        </p:nvPicPr>
-        <p:blipFill>
-          <a:blip r:embed="rId5">
-            <a:extLst>
-              <a:ext uri="{28A0092B-C50C-407E-A947-70E740481C1C}">
-                <a14:useLocalDpi xmlns:a14="http://schemas.microsoft.com/office/drawing/2010/main" val="0"/>
-              </a:ext>
-              <a:ext uri="{96DAC541-7B7A-43D3-8B79-37D633B846F1}">
-                <asvg:svgBlip xmlns:asvg="http://schemas.microsoft.com/office/drawing/2016/SVG/main" r:embed="rId6"/>
-              </a:ext>
-            </a:extLst>
-          </a:blip>
-          <a:stretch>
-            <a:fillRect/>
-          </a:stretch>
-        </p:blipFill>
-        <p:spPr>
-          <a:xfrm>
-            <a:off x="69998" y="6112791"/>
-            <a:ext cx="574303" cy="574303"/>
-          </a:xfrm>
-          <a:prstGeom prst="rect">
-            <a:avLst/>
-          </a:prstGeom>
-        </p:spPr>
-      </p:pic>
-      <p:pic>
-        <p:nvPicPr>
-          <p:cNvPr id="26" name="גרפיקה 25" descr="סטטיסטיקה עם מילוי מלא">
-            <a:extLst>
-              <a:ext uri="{FF2B5EF4-FFF2-40B4-BE49-F238E27FC236}">
-                <a16:creationId xmlns:a16="http://schemas.microsoft.com/office/drawing/2014/main" id="{95A563B4-DC37-4198-AC8D-9CD543AB67E9}"/>
-              </a:ext>
-            </a:extLst>
-          </p:cNvPr>
-          <p:cNvPicPr>
-            <a:picLocks noChangeAspect="1"/>
-          </p:cNvPicPr>
-          <p:nvPr/>
-        </p:nvPicPr>
-        <p:blipFill>
-          <a:blip r:embed="rId7">
-            <a:extLst>
-              <a:ext uri="{28A0092B-C50C-407E-A947-70E740481C1C}">
-                <a14:useLocalDpi xmlns:a14="http://schemas.microsoft.com/office/drawing/2010/main" val="0"/>
-              </a:ext>
-              <a:ext uri="{96DAC541-7B7A-43D3-8B79-37D633B846F1}">
-                <asvg:svgBlip xmlns:asvg="http://schemas.microsoft.com/office/drawing/2016/SVG/main" r:embed="rId8"/>
-              </a:ext>
-            </a:extLst>
-          </a:blip>
-          <a:stretch>
-            <a:fillRect/>
-          </a:stretch>
-        </p:blipFill>
-        <p:spPr>
-          <a:xfrm>
-            <a:off x="55163" y="5497096"/>
-            <a:ext cx="574303" cy="574303"/>
-          </a:xfrm>
-          <a:prstGeom prst="rect">
-            <a:avLst/>
-          </a:prstGeom>
-        </p:spPr>
-      </p:pic>
+              <a:t>Initial Attempts</a:t>
+            </a:r>
+          </a:p>
+        </p:txBody>
+      </p:sp>
     </p:spTree>
     <p:extLst>
       <p:ext uri="{BB962C8B-B14F-4D97-AF65-F5344CB8AC3E}">
-        <p14:creationId xmlns:p14="http://schemas.microsoft.com/office/powerpoint/2010/main" val="755506047"/>
+        <p14:creationId xmlns:p14="http://schemas.microsoft.com/office/powerpoint/2010/main" val="2254459902"/>
       </p:ext>
     </p:extLst>
   </p:cSld>

</xml_diff>